<commit_message>
Included all MVC Projects into One Solution. Migrating to .Net5.0
</commit_message>
<xml_diff>
--- a/3_mvcCore/slides/1MVC Overview.pptx
+++ b/3_mvcCore/slides/1MVC Overview.pptx
@@ -220,7 +220,7 @@
           <a:p>
             <a:fld id="{1CA3DF46-1122-49F8-B2FC-AA89D59712B3}" type="datetimeFigureOut">
               <a:rPr lang="en-IN" smtClean="0"/>
-              <a:t>27-02-2023</a:t>
+              <a:t>28-03-2023</a:t>
             </a:fld>
             <a:endParaRPr lang="en-IN"/>
           </a:p>
@@ -4552,7 +4552,7 @@
           <a:p>
             <a:fld id="{4AAD347D-5ACD-4C99-B74B-A9C85AD731AF}" type="datetimeFigureOut">
               <a:rPr lang="en-US" dirty="0"/>
-              <a:t>2/27/2023</a:t>
+              <a:t>3/28/2023</a:t>
             </a:fld>
             <a:endParaRPr lang="en-US" dirty="0"/>
           </a:p>
@@ -4722,7 +4722,7 @@
           <a:p>
             <a:fld id="{87DE6118-2437-4B30-8E3C-4D2BE6020583}" type="datetimeFigureOut">
               <a:rPr lang="en-US" smtClean="0"/>
-              <a:t>2/27/2023</a:t>
+              <a:t>3/28/2023</a:t>
             </a:fld>
             <a:endParaRPr lang="en-US" dirty="0"/>
           </a:p>
@@ -4970,7 +4970,7 @@
             <a:fld id="{87DE6118-2437-4B30-8E3C-4D2BE6020583}" type="datetimeFigureOut">
               <a:rPr lang="en-US" smtClean="0"/>
               <a:pPr/>
-              <a:t>2/27/2023</a:t>
+              <a:t>3/28/2023</a:t>
             </a:fld>
             <a:endParaRPr lang="en-US" dirty="0"/>
           </a:p>
@@ -5263,7 +5263,7 @@
           <a:p>
             <a:fld id="{9796027F-7875-4030-9381-8BD8C4F21935}" type="datetimeFigureOut">
               <a:rPr lang="en-US" dirty="0"/>
-              <a:t>2/27/2023</a:t>
+              <a:t>3/28/2023</a:t>
             </a:fld>
             <a:endParaRPr lang="en-US" dirty="0"/>
           </a:p>
@@ -5707,7 +5707,7 @@
           <a:p>
             <a:fld id="{87DE6118-2437-4B30-8E3C-4D2BE6020583}" type="datetimeFigureOut">
               <a:rPr lang="en-US" smtClean="0"/>
-              <a:t>2/27/2023</a:t>
+              <a:t>3/28/2023</a:t>
             </a:fld>
             <a:endParaRPr lang="en-US" dirty="0"/>
           </a:p>
@@ -5826,7 +5826,7 @@
           <a:p>
             <a:fld id="{87DE6118-2437-4B30-8E3C-4D2BE6020583}" type="datetimeFigureOut">
               <a:rPr lang="en-US" smtClean="0"/>
-              <a:t>2/27/2023</a:t>
+              <a:t>3/28/2023</a:t>
             </a:fld>
             <a:endParaRPr lang="en-US" dirty="0"/>
           </a:p>
@@ -6659,7 +6659,7 @@
           <a:p>
             <a:fld id="{87DE6118-2437-4B30-8E3C-4D2BE6020583}" type="datetimeFigureOut">
               <a:rPr lang="en-US" smtClean="0"/>
-              <a:t>2/27/2023</a:t>
+              <a:t>3/28/2023</a:t>
             </a:fld>
             <a:endParaRPr lang="en-US" dirty="0"/>
           </a:p>
@@ -6940,7 +6940,7 @@
             <a:fld id="{87DE6118-2437-4B30-8E3C-4D2BE6020583}" type="datetimeFigureOut">
               <a:rPr lang="en-US" smtClean="0"/>
               <a:pPr/>
-              <a:t>2/27/2023</a:t>
+              <a:t>3/28/2023</a:t>
             </a:fld>
             <a:endParaRPr lang="en-US" dirty="0"/>
           </a:p>
@@ -7217,7 +7217,7 @@
             <a:fld id="{87DE6118-2437-4B30-8E3C-4D2BE6020583}" type="datetimeFigureOut">
               <a:rPr lang="en-US" smtClean="0"/>
               <a:pPr/>
-              <a:t>2/27/2023</a:t>
+              <a:t>3/28/2023</a:t>
             </a:fld>
             <a:endParaRPr lang="en-US" dirty="0"/>
           </a:p>
@@ -7494,7 +7494,7 @@
             <a:fld id="{87DE6118-2437-4B30-8E3C-4D2BE6020583}" type="datetimeFigureOut">
               <a:rPr lang="en-US" smtClean="0"/>
               <a:pPr/>
-              <a:t>2/27/2023</a:t>
+              <a:t>3/28/2023</a:t>
             </a:fld>
             <a:endParaRPr lang="en-US" dirty="0"/>
           </a:p>
@@ -7690,7 +7690,7 @@
             <a:fld id="{87DE6118-2437-4B30-8E3C-4D2BE6020583}" type="datetimeFigureOut">
               <a:rPr lang="en-US" smtClean="0"/>
               <a:pPr/>
-              <a:t>2/27/2023</a:t>
+              <a:t>3/28/2023</a:t>
             </a:fld>
             <a:endParaRPr lang="en-US" dirty="0"/>
           </a:p>
@@ -7965,7 +7965,7 @@
             <a:fld id="{87DE6118-2437-4B30-8E3C-4D2BE6020583}" type="datetimeFigureOut">
               <a:rPr lang="en-US" smtClean="0"/>
               <a:pPr/>
-              <a:t>2/27/2023</a:t>
+              <a:t>3/28/2023</a:t>
             </a:fld>
             <a:endParaRPr lang="en-US" dirty="0"/>
           </a:p>
@@ -8308,7 +8308,7 @@
             <a:fld id="{87DE6118-2437-4B30-8E3C-4D2BE6020583}" type="datetimeFigureOut">
               <a:rPr lang="en-US" smtClean="0"/>
               <a:pPr/>
-              <a:t>2/27/2023</a:t>
+              <a:t>3/28/2023</a:t>
             </a:fld>
             <a:endParaRPr lang="en-US" dirty="0"/>
           </a:p>
@@ -8933,7 +8933,7 @@
             <a:fld id="{87DE6118-2437-4B30-8E3C-4D2BE6020583}" type="datetimeFigureOut">
               <a:rPr lang="en-US" smtClean="0"/>
               <a:pPr/>
-              <a:t>2/27/2023</a:t>
+              <a:t>3/28/2023</a:t>
             </a:fld>
             <a:endParaRPr lang="en-US" dirty="0"/>
           </a:p>
@@ -9795,7 +9795,7 @@
             <a:fld id="{87DE6118-2437-4B30-8E3C-4D2BE6020583}" type="datetimeFigureOut">
               <a:rPr lang="en-US" smtClean="0"/>
               <a:pPr/>
-              <a:t>2/27/2023</a:t>
+              <a:t>3/28/2023</a:t>
             </a:fld>
             <a:endParaRPr lang="en-US" dirty="0"/>
           </a:p>
@@ -9966,7 +9966,7 @@
           <a:p>
             <a:fld id="{87DE6118-2437-4B30-8E3C-4D2BE6020583}" type="datetimeFigureOut">
               <a:rPr lang="en-US" smtClean="0"/>
-              <a:t>2/27/2023</a:t>
+              <a:t>3/28/2023</a:t>
             </a:fld>
             <a:endParaRPr lang="en-US" dirty="0"/>
           </a:p>
@@ -10317,7 +10317,7 @@
           <a:p>
             <a:fld id="{87DE6118-2437-4B30-8E3C-4D2BE6020583}" type="datetimeFigureOut">
               <a:rPr lang="en-US" smtClean="0"/>
-              <a:t>2/27/2023</a:t>
+              <a:t>3/28/2023</a:t>
             </a:fld>
             <a:endParaRPr lang="en-US" dirty="0"/>
           </a:p>
@@ -11288,7 +11288,7 @@
             <a:fld id="{1D8BD707-D9CF-40AE-B4C6-C98DA3205C09}" type="datetimeFigureOut">
               <a:rPr lang="en-US" smtClean="0"/>
               <a:pPr/>
-              <a:t>2/27/2023</a:t>
+              <a:t>3/28/2023</a:t>
             </a:fld>
             <a:endParaRPr lang="en-US"/>
           </a:p>
@@ -14430,7 +14430,7 @@
           <a:p>
             <a:fld id="{4AAD347D-5ACD-4C99-B74B-A9C85AD731AF}" type="datetimeFigureOut">
               <a:rPr lang="en-US" dirty="0"/>
-              <a:t>2/27/2023</a:t>
+              <a:t>3/28/2023</a:t>
             </a:fld>
             <a:endParaRPr lang="en-US" dirty="0"/>
           </a:p>
@@ -17139,7 +17139,7 @@
         <p:spPr>
           <a:xfrm>
             <a:off x="1143000" y="1524000"/>
-            <a:ext cx="7467600" cy="3124200"/>
+            <a:ext cx="7467600" cy="3962400"/>
           </a:xfrm>
         </p:spPr>
         <p:txBody>

</xml_diff>